<commit_message>
Final Notebook and Readme
</commit_message>
<xml_diff>
--- a/customer_churn.pptx
+++ b/customer_churn.pptx
@@ -116,6 +116,14 @@
       </a:defRPr>
     </a:lvl9pPr>
   </p:defaultTextStyle>
+  <p:extLst>
+    <p:ext uri="{EFAFB233-063F-42B5-8137-9DF3F51BA10A}">
+      <p15:sldGuideLst xmlns:p15="http://schemas.microsoft.com/office/powerpoint/2012/main"/>
+    </p:ext>
+    <p:ext uri="{2D200454-40CA-4A62-9FC3-DE9A4176ACB9}">
+      <p15:notesGuideLst xmlns:p15="http://schemas.microsoft.com/office/powerpoint/2012/main"/>
+    </p:ext>
+  </p:extLst>
 </p:presentation>
 </file>
 
@@ -198,6 +206,11 @@
               </a:ln>
               <a:effectLst/>
             </c:spPr>
+            <c:extLst>
+              <c:ext xmlns:c16="http://schemas.microsoft.com/office/drawing/2014/chart" uri="{C3380CC4-5D6E-409C-BE32-E72D297353CC}">
+                <c16:uniqueId val="{00000001-FE44-4527-984C-EDBDB82600E0}"/>
+              </c:ext>
+            </c:extLst>
           </c:dPt>
           <c:dPt>
             <c:idx val="1"/>
@@ -215,6 +228,11 @@
               </a:ln>
               <a:effectLst/>
             </c:spPr>
+            <c:extLst>
+              <c:ext xmlns:c16="http://schemas.microsoft.com/office/drawing/2014/chart" uri="{C3380CC4-5D6E-409C-BE32-E72D297353CC}">
+                <c16:uniqueId val="{00000003-FE44-4527-984C-EDBDB82600E0}"/>
+              </c:ext>
+            </c:extLst>
           </c:dPt>
           <c:dLbls>
             <c:spPr>
@@ -1011,6 +1029,11 @@
               </a:ln>
               <a:effectLst/>
             </c:spPr>
+            <c:extLst>
+              <c:ext xmlns:c16="http://schemas.microsoft.com/office/drawing/2014/chart" uri="{C3380CC4-5D6E-409C-BE32-E72D297353CC}">
+                <c16:uniqueId val="{00000001-A830-45EC-928C-9707914BAB2E}"/>
+              </c:ext>
+            </c:extLst>
           </c:dPt>
           <c:dPt>
             <c:idx val="1"/>
@@ -1026,6 +1049,11 @@
               </a:ln>
               <a:effectLst/>
             </c:spPr>
+            <c:extLst>
+              <c:ext xmlns:c16="http://schemas.microsoft.com/office/drawing/2014/chart" uri="{C3380CC4-5D6E-409C-BE32-E72D297353CC}">
+                <c16:uniqueId val="{00000003-A830-45EC-928C-9707914BAB2E}"/>
+              </c:ext>
+            </c:extLst>
           </c:dPt>
           <c:dLbls>
             <c:spPr>
@@ -2909,7 +2937,7 @@
           <a:p>
             <a:fld id="{7D2D3842-A145-4953-BF5C-E3D755201C0E}" type="datetimeFigureOut">
               <a:rPr lang="en-US" smtClean="0"/>
-              <a:t>8/13/2021</a:t>
+              <a:t>8/19/2021</a:t>
             </a:fld>
             <a:endParaRPr lang="en-US"/>
           </a:p>
@@ -7548,7 +7576,7 @@
           <a:p>
             <a:fld id="{48A87A34-81AB-432B-8DAE-1953F412C126}" type="datetimeFigureOut">
               <a:rPr lang="en-US" dirty="0"/>
-              <a:t>8/13/2021</a:t>
+              <a:t>8/19/2021</a:t>
             </a:fld>
             <a:endParaRPr lang="en-US" dirty="0"/>
           </a:p>
@@ -7810,7 +7838,7 @@
           <a:p>
             <a:fld id="{48A87A34-81AB-432B-8DAE-1953F412C126}" type="datetimeFigureOut">
               <a:rPr lang="en-US" dirty="0"/>
-              <a:t>8/13/2021</a:t>
+              <a:t>8/19/2021</a:t>
             </a:fld>
             <a:endParaRPr lang="en-US" dirty="0"/>
           </a:p>
@@ -8001,7 +8029,7 @@
           <a:p>
             <a:fld id="{48A87A34-81AB-432B-8DAE-1953F412C126}" type="datetimeFigureOut">
               <a:rPr lang="en-US" dirty="0"/>
-              <a:t>8/13/2021</a:t>
+              <a:t>8/19/2021</a:t>
             </a:fld>
             <a:endParaRPr lang="en-US" dirty="0"/>
           </a:p>
@@ -8259,7 +8287,7 @@
           <a:p>
             <a:fld id="{48A87A34-81AB-432B-8DAE-1953F412C126}" type="datetimeFigureOut">
               <a:rPr lang="en-US" dirty="0"/>
-              <a:t>8/13/2021</a:t>
+              <a:t>8/19/2021</a:t>
             </a:fld>
             <a:endParaRPr lang="en-US" dirty="0"/>
           </a:p>
@@ -8688,7 +8716,7 @@
           <a:p>
             <a:fld id="{48A87A34-81AB-432B-8DAE-1953F412C126}" type="datetimeFigureOut">
               <a:rPr lang="en-US" dirty="0"/>
-              <a:t>8/13/2021</a:t>
+              <a:t>8/19/2021</a:t>
             </a:fld>
             <a:endParaRPr lang="en-US" dirty="0"/>
           </a:p>
@@ -9229,7 +9257,7 @@
           <a:p>
             <a:fld id="{48A87A34-81AB-432B-8DAE-1953F412C126}" type="datetimeFigureOut">
               <a:rPr lang="en-US" dirty="0"/>
-              <a:t>8/13/2021</a:t>
+              <a:t>8/19/2021</a:t>
             </a:fld>
             <a:endParaRPr lang="en-US" dirty="0"/>
           </a:p>
@@ -9944,7 +9972,7 @@
           <a:p>
             <a:fld id="{48A87A34-81AB-432B-8DAE-1953F412C126}" type="datetimeFigureOut">
               <a:rPr lang="en-US" dirty="0"/>
-              <a:t>8/13/2021</a:t>
+              <a:t>8/19/2021</a:t>
             </a:fld>
             <a:endParaRPr lang="en-US" dirty="0"/>
           </a:p>
@@ -10109,7 +10137,7 @@
           <a:p>
             <a:fld id="{48A87A34-81AB-432B-8DAE-1953F412C126}" type="datetimeFigureOut">
               <a:rPr lang="en-US" dirty="0"/>
-              <a:t>8/13/2021</a:t>
+              <a:t>8/19/2021</a:t>
             </a:fld>
             <a:endParaRPr lang="en-US" dirty="0"/>
           </a:p>
@@ -10284,7 +10312,7 @@
           <a:p>
             <a:fld id="{48A87A34-81AB-432B-8DAE-1953F412C126}" type="datetimeFigureOut">
               <a:rPr lang="en-US" dirty="0"/>
-              <a:t>8/13/2021</a:t>
+              <a:t>8/19/2021</a:t>
             </a:fld>
             <a:endParaRPr lang="en-US" dirty="0"/>
           </a:p>
@@ -10449,7 +10477,7 @@
           <a:p>
             <a:fld id="{48A87A34-81AB-432B-8DAE-1953F412C126}" type="datetimeFigureOut">
               <a:rPr lang="en-US" dirty="0"/>
-              <a:t>8/13/2021</a:t>
+              <a:t>8/19/2021</a:t>
             </a:fld>
             <a:endParaRPr lang="en-US" dirty="0"/>
           </a:p>
@@ -10694,7 +10722,7 @@
           <a:p>
             <a:fld id="{48A87A34-81AB-432B-8DAE-1953F412C126}" type="datetimeFigureOut">
               <a:rPr lang="en-US" dirty="0"/>
-              <a:t>8/13/2021</a:t>
+              <a:t>8/19/2021</a:t>
             </a:fld>
             <a:endParaRPr lang="en-US" dirty="0"/>
           </a:p>
@@ -10921,7 +10949,7 @@
           <a:p>
             <a:fld id="{48A87A34-81AB-432B-8DAE-1953F412C126}" type="datetimeFigureOut">
               <a:rPr lang="en-US" dirty="0"/>
-              <a:t>8/13/2021</a:t>
+              <a:t>8/19/2021</a:t>
             </a:fld>
             <a:endParaRPr lang="en-US" dirty="0"/>
           </a:p>
@@ -11297,7 +11325,7 @@
           <a:p>
             <a:fld id="{48A87A34-81AB-432B-8DAE-1953F412C126}" type="datetimeFigureOut">
               <a:rPr lang="en-US" dirty="0"/>
-              <a:t>8/13/2021</a:t>
+              <a:t>8/19/2021</a:t>
             </a:fld>
             <a:endParaRPr lang="en-US" dirty="0"/>
           </a:p>
@@ -11410,7 +11438,7 @@
           <a:p>
             <a:fld id="{48A87A34-81AB-432B-8DAE-1953F412C126}" type="datetimeFigureOut">
               <a:rPr lang="en-US" dirty="0"/>
-              <a:t>8/13/2021</a:t>
+              <a:t>8/19/2021</a:t>
             </a:fld>
             <a:endParaRPr lang="en-US" dirty="0"/>
           </a:p>
@@ -11500,7 +11528,7 @@
           <a:p>
             <a:fld id="{48A87A34-81AB-432B-8DAE-1953F412C126}" type="datetimeFigureOut">
               <a:rPr lang="en-US" dirty="0"/>
-              <a:t>8/13/2021</a:t>
+              <a:t>8/19/2021</a:t>
             </a:fld>
             <a:endParaRPr lang="en-US" dirty="0"/>
           </a:p>
@@ -11744,7 +11772,7 @@
           <a:p>
             <a:fld id="{48A87A34-81AB-432B-8DAE-1953F412C126}" type="datetimeFigureOut">
               <a:rPr lang="en-US" dirty="0"/>
-              <a:t>8/13/2021</a:t>
+              <a:t>8/19/2021</a:t>
             </a:fld>
             <a:endParaRPr lang="en-US" dirty="0"/>
           </a:p>
@@ -12019,7 +12047,7 @@
           <a:p>
             <a:fld id="{48A87A34-81AB-432B-8DAE-1953F412C126}" type="datetimeFigureOut">
               <a:rPr lang="en-US" dirty="0"/>
-              <a:t>8/13/2021</a:t>
+              <a:t>8/19/2021</a:t>
             </a:fld>
             <a:endParaRPr lang="en-US" dirty="0"/>
           </a:p>
@@ -15092,7 +15120,7 @@
             <a:fld id="{48A87A34-81AB-432B-8DAE-1953F412C126}" type="datetimeFigureOut">
               <a:rPr lang="en-US" dirty="0"/>
               <a:pPr/>
-              <a:t>8/13/2021</a:t>
+              <a:t>8/19/2021</a:t>
             </a:fld>
             <a:endParaRPr lang="en-US" dirty="0"/>
           </a:p>
@@ -16046,7 +16074,7 @@
             </a:pPr>
             <a:r>
               <a:rPr lang="en-US" sz="2000" dirty="0"/>
-              <a:t>Our model has a precision score of 97% when predicting customers that retain their service and a precision score of 100% when predicting customers that churn.</a:t>
+              <a:t>Our model has a precision score of 0.97 when predicting customers that retain their service and a precision score of 1.00 when predicting customers that churn.</a:t>
             </a:r>
           </a:p>
           <a:p>
@@ -16529,7 +16557,7 @@
             </a:pPr>
             <a:r>
               <a:rPr lang="en-US" dirty="0"/>
-              <a:t>Only 17% of our customers have a voicemail plan.</a:t>
+              <a:t>Only 28% of our customers have a voicemail plan.</a:t>
             </a:r>
           </a:p>
           <a:p>
@@ -16539,7 +16567,7 @@
             </a:pPr>
             <a:r>
               <a:rPr lang="en-US" dirty="0"/>
-              <a:t>83% of the customers that churn do not have a voicemail plan.</a:t>
+              <a:t>72% of the customers that churn do not have a voicemail plan.</a:t>
             </a:r>
           </a:p>
           <a:p>
@@ -16549,7 +16577,7 @@
             </a:pPr>
             <a:r>
               <a:rPr lang="en-US" dirty="0"/>
-              <a:t>17% of the customers that churn have the voicemail plan.</a:t>
+              <a:t>28% of the customers that churn have the voicemail plan.</a:t>
             </a:r>
           </a:p>
           <a:p>
@@ -16574,7 +16602,7 @@
           <p:nvPr>
             <p:extLst>
               <p:ext uri="{D42A27DB-BD31-4B8C-83A1-F6EECF244321}">
-                <p14:modId xmlns:p14="http://schemas.microsoft.com/office/powerpoint/2010/main" val="4132051830"/>
+                <p14:modId xmlns:p14="http://schemas.microsoft.com/office/powerpoint/2010/main" val="2843498940"/>
               </p:ext>
             </p:extLst>
           </p:nvPr>

</xml_diff>